<commit_message>
Removed Forth slides, plus lots of improvements all over.
</commit_message>
<xml_diff>
--- a/EPS-Interactivity.pptx
+++ b/EPS-Interactivity.pptx
@@ -149,6 +149,22 @@
       </a:defRPr>
     </a:lvl9pPr>
   </p:defaultTextStyle>
+  <p:extLst>
+    <p:ext uri="{EFAFB233-063F-42B5-8137-9DF3F51BA10A}">
+      <p15:sldGuideLst xmlns:p15="http://schemas.microsoft.com/office/powerpoint/2012/main">
+        <p15:guide id="1" orient="horz" pos="2160">
+          <p15:clr>
+            <a:srgbClr val="A4A3A4"/>
+          </p15:clr>
+        </p15:guide>
+        <p15:guide id="2" pos="2880">
+          <p15:clr>
+            <a:srgbClr val="A4A3A4"/>
+          </p15:clr>
+        </p15:guide>
+      </p15:sldGuideLst>
+    </p:ext>
+  </p:extLst>
 </p:presentation>
 </file>
 
@@ -235,7 +251,7 @@
             <a:fld id="{D485E2B6-AE61-47EF-A3D2-23CEA956552E}" type="datetimeFigureOut">
               <a:rPr lang="en-US" smtClean="0"/>
               <a:pPr/>
-              <a:t>3/2/2014</a:t>
+              <a:t>5/26/2020</a:t>
             </a:fld>
             <a:endParaRPr lang="en-US"/>
           </a:p>
@@ -798,7 +814,7 @@
             <a:fld id="{B2017604-314E-6242-BCBD-5102D3DDA4A5}" type="datetimeFigureOut">
               <a:rPr lang="en-US" smtClean="0"/>
               <a:pPr/>
-              <a:t>3/2/2014</a:t>
+              <a:t>5/26/2020</a:t>
             </a:fld>
             <a:endParaRPr lang="en-US"/>
           </a:p>
@@ -991,7 +1007,7 @@
             <a:fld id="{B2017604-314E-6242-BCBD-5102D3DDA4A5}" type="datetimeFigureOut">
               <a:rPr lang="en-US" smtClean="0"/>
               <a:pPr/>
-              <a:t>3/2/2014</a:t>
+              <a:t>5/26/2020</a:t>
             </a:fld>
             <a:endParaRPr lang="en-US"/>
           </a:p>
@@ -1178,7 +1194,7 @@
             <a:fld id="{B2017604-314E-6242-BCBD-5102D3DDA4A5}" type="datetimeFigureOut">
               <a:rPr lang="en-US" smtClean="0"/>
               <a:pPr/>
-              <a:t>3/2/2014</a:t>
+              <a:t>5/26/2020</a:t>
             </a:fld>
             <a:endParaRPr lang="en-US"/>
           </a:p>
@@ -1864,7 +1880,7 @@
             <a:fld id="{B2017604-314E-6242-BCBD-5102D3DDA4A5}" type="datetimeFigureOut">
               <a:rPr lang="en-US" smtClean="0"/>
               <a:pPr/>
-              <a:t>3/2/2014</a:t>
+              <a:t>5/26/2020</a:t>
             </a:fld>
             <a:endParaRPr lang="en-US"/>
           </a:p>
@@ -2108,7 +2124,7 @@
             <a:fld id="{B2017604-314E-6242-BCBD-5102D3DDA4A5}" type="datetimeFigureOut">
               <a:rPr lang="en-US" smtClean="0"/>
               <a:pPr/>
-              <a:t>3/2/2014</a:t>
+              <a:t>5/26/2020</a:t>
             </a:fld>
             <a:endParaRPr lang="en-US"/>
           </a:p>
@@ -2346,7 +2362,7 @@
             <a:fld id="{B2017604-314E-6242-BCBD-5102D3DDA4A5}" type="datetimeFigureOut">
               <a:rPr lang="en-US" smtClean="0"/>
               <a:pPr/>
-              <a:t>3/2/2014</a:t>
+              <a:t>5/26/2020</a:t>
             </a:fld>
             <a:endParaRPr lang="en-US"/>
           </a:p>
@@ -2543,7 +2559,7 @@
             <a:fld id="{B2017604-314E-6242-BCBD-5102D3DDA4A5}" type="datetimeFigureOut">
               <a:rPr lang="en-US" smtClean="0"/>
               <a:pPr/>
-              <a:t>3/2/2014</a:t>
+              <a:t>5/26/2020</a:t>
             </a:fld>
             <a:endParaRPr lang="en-US"/>
           </a:p>
@@ -2643,7 +2659,7 @@
             <a:fld id="{B2017604-314E-6242-BCBD-5102D3DDA4A5}" type="datetimeFigureOut">
               <a:rPr lang="en-US" smtClean="0"/>
               <a:pPr/>
-              <a:t>3/2/2014</a:t>
+              <a:t>5/26/2020</a:t>
             </a:fld>
             <a:endParaRPr lang="en-US"/>
           </a:p>
@@ -2781,7 +2797,7 @@
             <a:fld id="{B2017604-314E-6242-BCBD-5102D3DDA4A5}" type="datetimeFigureOut">
               <a:rPr lang="en-US" smtClean="0"/>
               <a:pPr/>
-              <a:t>3/2/2014</a:t>
+              <a:t>5/26/2020</a:t>
             </a:fld>
             <a:endParaRPr lang="en-US"/>
           </a:p>
@@ -3301,7 +3317,7 @@
             <a:fld id="{B2017604-314E-6242-BCBD-5102D3DDA4A5}" type="datetimeFigureOut">
               <a:rPr lang="en-US" smtClean="0"/>
               <a:pPr/>
-              <a:t>3/2/2014</a:t>
+              <a:t>5/26/2020</a:t>
             </a:fld>
             <a:endParaRPr lang="en-US"/>
           </a:p>
@@ -4120,39 +4136,10 @@
         <p:spPr/>
         <p:txBody>
           <a:bodyPr>
-            <a:normAutofit fontScale="90000"/>
+            <a:normAutofit/>
           </a:bodyPr>
           <a:lstStyle/>
           <a:p>
-            <a:r>
-              <a:rPr lang="en-US" dirty="0" smtClean="0"/>
-              <a:t>INF 212</a:t>
-            </a:r>
-            <a:br>
-              <a:rPr lang="en-US" dirty="0" smtClean="0"/>
-            </a:br>
-            <a:r>
-              <a:rPr lang="en-US" sz="3556" dirty="0" smtClean="0"/>
-              <a:t>ANALYSIS OF PROG. </a:t>
-            </a:r>
-            <a:r>
-              <a:rPr lang="en-US" sz="3556" dirty="0" err="1" smtClean="0"/>
-              <a:t>LANGs.</a:t>
-            </a:r>
-            <a:r>
-              <a:rPr lang="en-US" dirty="0" smtClean="0"/>
-              <a:t/>
-            </a:r>
-            <a:br>
-              <a:rPr lang="en-US" dirty="0" smtClean="0"/>
-            </a:br>
-            <a:r>
-              <a:rPr lang="en-US" dirty="0" smtClean="0"/>
-              <a:t/>
-            </a:r>
-            <a:br>
-              <a:rPr lang="en-US" dirty="0" smtClean="0"/>
-            </a:br>
             <a:r>
               <a:rPr lang="en-US" dirty="0" smtClean="0"/>
               <a:t>Interactivity</a:t>
@@ -5879,6 +5866,13 @@
   <p:clrMapOvr>
     <a:masterClrMapping/>
   </p:clrMapOvr>
+  <p:timing>
+    <p:tnLst>
+      <p:par>
+        <p:cTn id="1" dur="indefinite" restart="never" nodeType="tmRoot"/>
+      </p:par>
+    </p:tnLst>
+  </p:timing>
 </p:sld>
 </file>
 
@@ -9721,7 +9715,6 @@
               <a:rPr lang="en-US" dirty="0" smtClean="0"/>
               <a:t>Client-server / Request-Response</a:t>
             </a:r>
-            <a:endParaRPr lang="en-US" dirty="0" smtClean="0"/>
           </a:p>
           <a:p>
             <a:r>
@@ -9746,13 +9739,6 @@
               </a:rPr>
               <a:t>Caching</a:t>
             </a:r>
-            <a:endParaRPr lang="en-US" dirty="0" smtClean="0">
-              <a:solidFill>
-                <a:schemeClr val="bg1">
-                  <a:lumMod val="65000"/>
-                </a:schemeClr>
-              </a:solidFill>
-            </a:endParaRPr>
           </a:p>
           <a:p>
             <a:r>
@@ -10058,11 +10044,7 @@
           <a:p>
             <a:r>
               <a:rPr lang="en-US" dirty="0" smtClean="0"/>
-              <a:t>Design Principle: </a:t>
-            </a:r>
-            <a:r>
-              <a:rPr lang="en-US" dirty="0" smtClean="0"/>
-              <a:t>Request-Response</a:t>
+              <a:t>Design Principle: Request-Response</a:t>
             </a:r>
             <a:endParaRPr lang="en-US" dirty="0"/>
           </a:p>
@@ -13077,11 +13059,7 @@
           <a:p>
             <a:r>
               <a:rPr lang="en-US" dirty="0" smtClean="0"/>
-              <a:t>Server </a:t>
-            </a:r>
-            <a:r>
-              <a:rPr lang="en-US" dirty="0" smtClean="0"/>
-              <a:t>may create resources (e.g. session info) regarding clients</a:t>
+              <a:t>Server may create resources (e.g. session info) regarding clients</a:t>
             </a:r>
           </a:p>
           <a:p>
@@ -14552,27 +14530,7 @@
             <a:pPr lvl="1"/>
             <a:r>
               <a:rPr lang="en-US" dirty="0" smtClean="0"/>
-              <a:t>Behavior</a:t>
-            </a:r>
-            <a:r>
-              <a:rPr lang="en-US" dirty="0" smtClean="0"/>
-              <a:t> </a:t>
-            </a:r>
-            <a:r>
-              <a:rPr lang="en-US" dirty="0" smtClean="0"/>
-              <a:t>that </a:t>
-            </a:r>
-            <a:r>
-              <a:rPr lang="en-US" dirty="0" smtClean="0"/>
-              <a:t>depends </a:t>
-            </a:r>
-            <a:r>
-              <a:rPr lang="en-US" dirty="0" smtClean="0"/>
-              <a:t>on </a:t>
-            </a:r>
-            <a:r>
-              <a:rPr lang="en-US" dirty="0" smtClean="0"/>
-              <a:t>history</a:t>
+              <a:t>Behavior that depends on history</a:t>
             </a:r>
           </a:p>
           <a:p>

</xml_diff>